<commit_message>
[FIX] some model adjustments (e.g. iCC651); Models identifiers
</commit_message>
<xml_diff>
--- a/plots/escher_maps.pptx
+++ b/plots/escher_maps.pptx
@@ -111,13 +111,18 @@
       </a:defRPr>
     </a:lvl9pPr>
   </p:defaultTextStyle>
+  <p:extLst>
+    <p:ext uri="{EFAFB233-063F-42B5-8137-9DF3F51BA10A}">
+      <p15:sldGuideLst xmlns:p15="http://schemas.microsoft.com/office/powerpoint/2012/main"/>
+    </p:ext>
+  </p:extLst>
 </p:presentation>
 </file>
 
 <file path=ppt/revisionInfo.xml><?xml version="1.0" encoding="utf-8"?>
 <p1510:revInfo xmlns:a="http://schemas.openxmlformats.org/drawingml/2006/main" xmlns:r="http://schemas.openxmlformats.org/officeDocument/2006/relationships" xmlns:p1510="http://schemas.microsoft.com/office/powerpoint/2015/10/main">
   <p1510:revLst>
-    <p1510:client id="{FE989250-A5F9-443C-B6A8-6F0DBE747987}" v="5" dt="2020-12-16T11:03:54.419"/>
+    <p1510:client id="{FE989250-A5F9-443C-B6A8-6F0DBE747987}" v="16" dt="2020-12-16T18:30:49.046"/>
   </p1510:revLst>
 </p1510:revInfo>
 </file>
@@ -126,13 +131,50 @@
 <pc:chgInfo xmlns:a="http://schemas.openxmlformats.org/drawingml/2006/main" xmlns:r="http://schemas.openxmlformats.org/officeDocument/2006/relationships" xmlns:ac="http://schemas.microsoft.com/office/drawing/2013/main/command" xmlns:pc="http://schemas.microsoft.com/office/powerpoint/2013/main/command">
   <pc:docChgLst>
     <pc:chgData name="Fernando João Pereira da Cruz" userId="afecf0b2-834d-400b-8e37-5233ba176018" providerId="ADAL" clId="{FE989250-A5F9-443C-B6A8-6F0DBE747987}"/>
-    <pc:docChg chg="custSel addSld modSld">
-      <pc:chgData name="Fernando João Pereira da Cruz" userId="afecf0b2-834d-400b-8e37-5233ba176018" providerId="ADAL" clId="{FE989250-A5F9-443C-B6A8-6F0DBE747987}" dt="2020-12-16T11:03:57.285" v="33" actId="1076"/>
+    <pc:docChg chg="undo custSel addSld modSld">
+      <pc:chgData name="Fernando João Pereira da Cruz" userId="afecf0b2-834d-400b-8e37-5233ba176018" providerId="ADAL" clId="{FE989250-A5F9-443C-B6A8-6F0DBE747987}" dt="2020-12-16T18:30:52.553" v="129" actId="1076"/>
       <pc:docMkLst>
         <pc:docMk/>
       </pc:docMkLst>
+      <pc:sldChg chg="modNotesTx">
+        <pc:chgData name="Fernando João Pereira da Cruz" userId="afecf0b2-834d-400b-8e37-5233ba176018" providerId="ADAL" clId="{FE989250-A5F9-443C-B6A8-6F0DBE747987}" dt="2020-12-16T18:25:41.386" v="37" actId="20577"/>
+        <pc:sldMkLst>
+          <pc:docMk/>
+          <pc:sldMk cId="3734650315" sldId="256"/>
+        </pc:sldMkLst>
+      </pc:sldChg>
+      <pc:sldChg chg="modNotesTx">
+        <pc:chgData name="Fernando João Pereira da Cruz" userId="afecf0b2-834d-400b-8e37-5233ba176018" providerId="ADAL" clId="{FE989250-A5F9-443C-B6A8-6F0DBE747987}" dt="2020-12-16T18:25:45.413" v="41" actId="20577"/>
+        <pc:sldMkLst>
+          <pc:docMk/>
+          <pc:sldMk cId="4201273006" sldId="258"/>
+        </pc:sldMkLst>
+      </pc:sldChg>
+      <pc:sldChg chg="addSp delSp modSp mod modNotesTx">
+        <pc:chgData name="Fernando João Pereira da Cruz" userId="afecf0b2-834d-400b-8e37-5233ba176018" providerId="ADAL" clId="{FE989250-A5F9-443C-B6A8-6F0DBE747987}" dt="2020-12-16T18:26:34.459" v="52" actId="1076"/>
+        <pc:sldMkLst>
+          <pc:docMk/>
+          <pc:sldMk cId="2733214702" sldId="259"/>
+        </pc:sldMkLst>
+        <pc:picChg chg="add mod modCrop">
+          <ac:chgData name="Fernando João Pereira da Cruz" userId="afecf0b2-834d-400b-8e37-5233ba176018" providerId="ADAL" clId="{FE989250-A5F9-443C-B6A8-6F0DBE747987}" dt="2020-12-16T18:26:34.459" v="52" actId="1076"/>
+          <ac:picMkLst>
+            <pc:docMk/>
+            <pc:sldMk cId="2733214702" sldId="259"/>
+            <ac:picMk id="3" creationId="{AA06AE88-62F3-4C10-9A8A-8969D4FF4192}"/>
+          </ac:picMkLst>
+        </pc:picChg>
+        <pc:picChg chg="del">
+          <ac:chgData name="Fernando João Pereira da Cruz" userId="afecf0b2-834d-400b-8e37-5233ba176018" providerId="ADAL" clId="{FE989250-A5F9-443C-B6A8-6F0DBE747987}" dt="2020-12-16T18:25:50.876" v="46" actId="478"/>
+          <ac:picMkLst>
+            <pc:docMk/>
+            <pc:sldMk cId="2733214702" sldId="259"/>
+            <ac:picMk id="5" creationId="{5B84E589-5FF5-4D4F-997B-C8206006F9E3}"/>
+          </ac:picMkLst>
+        </pc:picChg>
+      </pc:sldChg>
       <pc:sldChg chg="addSp delSp modSp new mod">
-        <pc:chgData name="Fernando João Pereira da Cruz" userId="afecf0b2-834d-400b-8e37-5233ba176018" providerId="ADAL" clId="{FE989250-A5F9-443C-B6A8-6F0DBE747987}" dt="2020-12-16T11:03:57.285" v="33" actId="1076"/>
+        <pc:chgData name="Fernando João Pereira da Cruz" userId="afecf0b2-834d-400b-8e37-5233ba176018" providerId="ADAL" clId="{FE989250-A5F9-443C-B6A8-6F0DBE747987}" dt="2020-12-16T18:30:52.553" v="129" actId="1076"/>
         <pc:sldMkLst>
           <pc:docMk/>
           <pc:sldMk cId="1674768841" sldId="260"/>
@@ -153,32 +195,64 @@
             <ac:spMk id="3" creationId="{50ABBF20-1995-481C-BBC5-17FA5CDAACEE}"/>
           </ac:spMkLst>
         </pc:spChg>
+        <pc:spChg chg="add del mod">
+          <ac:chgData name="Fernando João Pereira da Cruz" userId="afecf0b2-834d-400b-8e37-5233ba176018" providerId="ADAL" clId="{FE989250-A5F9-443C-B6A8-6F0DBE747987}" dt="2020-12-16T18:28:30.412" v="107" actId="767"/>
+          <ac:spMkLst>
+            <pc:docMk/>
+            <pc:sldMk cId="1674768841" sldId="260"/>
+            <ac:spMk id="3" creationId="{64946C5E-9F43-42EB-84AC-0CE4B0D03984}"/>
+          </ac:spMkLst>
+        </pc:spChg>
         <pc:spChg chg="add mod ord">
-          <ac:chgData name="Fernando João Pereira da Cruz" userId="afecf0b2-834d-400b-8e37-5233ba176018" providerId="ADAL" clId="{FE989250-A5F9-443C-B6A8-6F0DBE747987}" dt="2020-12-16T11:03:54.419" v="32" actId="164"/>
+          <ac:chgData name="Fernando João Pereira da Cruz" userId="afecf0b2-834d-400b-8e37-5233ba176018" providerId="ADAL" clId="{FE989250-A5F9-443C-B6A8-6F0DBE747987}" dt="2020-12-16T18:28:31.600" v="111" actId="164"/>
           <ac:spMkLst>
             <pc:docMk/>
             <pc:sldMk cId="1674768841" sldId="260"/>
             <ac:spMk id="8" creationId="{42C11584-1177-497A-B8F7-80515164F94D}"/>
           </ac:spMkLst>
         </pc:spChg>
+        <pc:spChg chg="add del mod">
+          <ac:chgData name="Fernando João Pereira da Cruz" userId="afecf0b2-834d-400b-8e37-5233ba176018" providerId="ADAL" clId="{FE989250-A5F9-443C-B6A8-6F0DBE747987}" dt="2020-12-16T18:28:28.011" v="95"/>
+          <ac:spMkLst>
+            <pc:docMk/>
+            <pc:sldMk cId="1674768841" sldId="260"/>
+            <ac:spMk id="11" creationId="{145C3012-74FC-4645-974B-C9413AD62EA1}"/>
+          </ac:spMkLst>
+        </pc:spChg>
         <pc:grpChg chg="add mod">
-          <ac:chgData name="Fernando João Pereira da Cruz" userId="afecf0b2-834d-400b-8e37-5233ba176018" providerId="ADAL" clId="{FE989250-A5F9-443C-B6A8-6F0DBE747987}" dt="2020-12-16T11:03:57.285" v="33" actId="1076"/>
+          <ac:chgData name="Fernando João Pereira da Cruz" userId="afecf0b2-834d-400b-8e37-5233ba176018" providerId="ADAL" clId="{FE989250-A5F9-443C-B6A8-6F0DBE747987}" dt="2020-12-16T18:28:31.600" v="111" actId="164"/>
+          <ac:grpSpMkLst>
+            <pc:docMk/>
+            <pc:sldMk cId="1674768841" sldId="260"/>
+            <ac:grpSpMk id="2" creationId="{5C645833-7227-41AA-9AC8-823E2D14A0E8}"/>
+          </ac:grpSpMkLst>
+        </pc:grpChg>
+        <pc:grpChg chg="add mod">
+          <ac:chgData name="Fernando João Pereira da Cruz" userId="afecf0b2-834d-400b-8e37-5233ba176018" providerId="ADAL" clId="{FE989250-A5F9-443C-B6A8-6F0DBE747987}" dt="2020-12-16T18:30:49.045" v="128" actId="164"/>
           <ac:grpSpMkLst>
             <pc:docMk/>
             <pc:sldMk cId="1674768841" sldId="260"/>
             <ac:grpSpMk id="9" creationId="{48E51BFD-330B-4378-AB3A-F25B60B6BC6D}"/>
           </ac:grpSpMkLst>
         </pc:grpChg>
+        <pc:grpChg chg="add mod">
+          <ac:chgData name="Fernando João Pereira da Cruz" userId="afecf0b2-834d-400b-8e37-5233ba176018" providerId="ADAL" clId="{FE989250-A5F9-443C-B6A8-6F0DBE747987}" dt="2020-12-16T18:30:52.553" v="129" actId="1076"/>
+          <ac:grpSpMkLst>
+            <pc:docMk/>
+            <pc:sldMk cId="1674768841" sldId="260"/>
+            <ac:grpSpMk id="14" creationId="{686152D1-A5FF-4E58-8EBA-1ED26008CA6A}"/>
+          </ac:grpSpMkLst>
+        </pc:grpChg>
         <pc:picChg chg="add mod">
-          <ac:chgData name="Fernando João Pereira da Cruz" userId="afecf0b2-834d-400b-8e37-5233ba176018" providerId="ADAL" clId="{FE989250-A5F9-443C-B6A8-6F0DBE747987}" dt="2020-12-16T11:03:54.419" v="32" actId="164"/>
+          <ac:chgData name="Fernando João Pereira da Cruz" userId="afecf0b2-834d-400b-8e37-5233ba176018" providerId="ADAL" clId="{FE989250-A5F9-443C-B6A8-6F0DBE747987}" dt="2020-12-16T18:28:31.600" v="111" actId="164"/>
           <ac:picMkLst>
             <pc:docMk/>
             <pc:sldMk cId="1674768841" sldId="260"/>
             <ac:picMk id="4" creationId="{4AC55DCA-6B09-410B-B771-532FE7006952}"/>
           </ac:picMkLst>
         </pc:picChg>
-        <pc:picChg chg="add mod">
-          <ac:chgData name="Fernando João Pereira da Cruz" userId="afecf0b2-834d-400b-8e37-5233ba176018" providerId="ADAL" clId="{FE989250-A5F9-443C-B6A8-6F0DBE747987}" dt="2020-12-16T11:03:54.419" v="32" actId="164"/>
+        <pc:picChg chg="add del mod">
+          <ac:chgData name="Fernando João Pereira da Cruz" userId="afecf0b2-834d-400b-8e37-5233ba176018" providerId="ADAL" clId="{FE989250-A5F9-443C-B6A8-6F0DBE747987}" dt="2020-12-16T18:26:40.226" v="53" actId="478"/>
           <ac:picMkLst>
             <pc:docMk/>
             <pc:sldMk cId="1674768841" sldId="260"/>
@@ -186,19 +260,43 @@
           </ac:picMkLst>
         </pc:picChg>
         <pc:picChg chg="add mod">
-          <ac:chgData name="Fernando João Pereira da Cruz" userId="afecf0b2-834d-400b-8e37-5233ba176018" providerId="ADAL" clId="{FE989250-A5F9-443C-B6A8-6F0DBE747987}" dt="2020-12-16T11:03:54.419" v="32" actId="164"/>
+          <ac:chgData name="Fernando João Pereira da Cruz" userId="afecf0b2-834d-400b-8e37-5233ba176018" providerId="ADAL" clId="{FE989250-A5F9-443C-B6A8-6F0DBE747987}" dt="2020-12-16T18:28:31.600" v="111" actId="164"/>
           <ac:picMkLst>
             <pc:docMk/>
             <pc:sldMk cId="1674768841" sldId="260"/>
             <ac:picMk id="6" creationId="{F1F664B2-ACB2-42D0-8EC2-496D964288A7}"/>
           </ac:picMkLst>
         </pc:picChg>
-        <pc:picChg chg="add mod">
-          <ac:chgData name="Fernando João Pereira da Cruz" userId="afecf0b2-834d-400b-8e37-5233ba176018" providerId="ADAL" clId="{FE989250-A5F9-443C-B6A8-6F0DBE747987}" dt="2020-12-16T11:03:54.419" v="32" actId="164"/>
+        <pc:picChg chg="add del mod">
+          <ac:chgData name="Fernando João Pereira da Cruz" userId="afecf0b2-834d-400b-8e37-5233ba176018" providerId="ADAL" clId="{FE989250-A5F9-443C-B6A8-6F0DBE747987}" dt="2020-12-16T18:29:10.129" v="117" actId="478"/>
           <ac:picMkLst>
             <pc:docMk/>
             <pc:sldMk cId="1674768841" sldId="260"/>
             <ac:picMk id="7" creationId="{A9D0C9E3-DA78-491C-B893-E39E39B9CDD7}"/>
+          </ac:picMkLst>
+        </pc:picChg>
+        <pc:picChg chg="add del mod">
+          <ac:chgData name="Fernando João Pereira da Cruz" userId="afecf0b2-834d-400b-8e37-5233ba176018" providerId="ADAL" clId="{FE989250-A5F9-443C-B6A8-6F0DBE747987}" dt="2020-12-16T18:29:01.949" v="116" actId="478"/>
+          <ac:picMkLst>
+            <pc:docMk/>
+            <pc:sldMk cId="1674768841" sldId="260"/>
+            <ac:picMk id="10" creationId="{9F6EBC28-DA92-400A-B189-5B1613127B5C}"/>
+          </ac:picMkLst>
+        </pc:picChg>
+        <pc:picChg chg="add mod">
+          <ac:chgData name="Fernando João Pereira da Cruz" userId="afecf0b2-834d-400b-8e37-5233ba176018" providerId="ADAL" clId="{FE989250-A5F9-443C-B6A8-6F0DBE747987}" dt="2020-12-16T18:30:49.045" v="128" actId="164"/>
+          <ac:picMkLst>
+            <pc:docMk/>
+            <pc:sldMk cId="1674768841" sldId="260"/>
+            <ac:picMk id="12" creationId="{5642CCD2-1399-4B15-9D50-7D381ED941EF}"/>
+          </ac:picMkLst>
+        </pc:picChg>
+        <pc:picChg chg="add mod">
+          <ac:chgData name="Fernando João Pereira da Cruz" userId="afecf0b2-834d-400b-8e37-5233ba176018" providerId="ADAL" clId="{FE989250-A5F9-443C-B6A8-6F0DBE747987}" dt="2020-12-16T18:30:49.045" v="128" actId="164"/>
+          <ac:picMkLst>
+            <pc:docMk/>
+            <pc:sldMk cId="1674768841" sldId="260"/>
+            <ac:picMk id="13" creationId="{9EA99AE4-2DC3-47E2-9A1C-A94A974B2295}"/>
           </ac:picMkLst>
         </pc:picChg>
       </pc:sldChg>
@@ -602,7 +700,7 @@
           <a:p>
             <a:r>
               <a:rPr lang="pt-PT" dirty="0"/>
-              <a:t>icc390</a:t>
+              <a:t>icc389</a:t>
             </a:r>
             <a:endParaRPr lang="en-US" dirty="0"/>
           </a:p>
@@ -778,7 +876,7 @@
           <a:p>
             <a:r>
               <a:rPr lang="pt-PT" dirty="0"/>
-              <a:t>icc464</a:t>
+              <a:t>icc470</a:t>
             </a:r>
             <a:endParaRPr lang="en-US" dirty="0"/>
           </a:p>
@@ -866,7 +964,7 @@
           <a:p>
             <a:r>
               <a:rPr lang="pt-PT" dirty="0"/>
-              <a:t>icc644</a:t>
+              <a:t>icc651</a:t>
             </a:r>
             <a:endParaRPr lang="en-US" dirty="0"/>
           </a:p>
@@ -4319,10 +4417,10 @@
       </p:grpSpPr>
       <p:pic>
         <p:nvPicPr>
-          <p:cNvPr id="5" name="Picture 4" descr="Diagram, schematic&#10;&#10;Description automatically generated">
-            <a:extLst>
-              <a:ext uri="{FF2B5EF4-FFF2-40B4-BE49-F238E27FC236}">
-                <a16:creationId xmlns:a16="http://schemas.microsoft.com/office/drawing/2014/main" id="{5B84E589-5FF5-4D4F-997B-C8206006F9E3}"/>
+          <p:cNvPr id="3" name="Picture 2">
+            <a:extLst>
+              <a:ext uri="{FF2B5EF4-FFF2-40B4-BE49-F238E27FC236}">
+                <a16:creationId xmlns:a16="http://schemas.microsoft.com/office/drawing/2014/main" id="{AA06AE88-62F3-4C10-9A8A-8969D4FF4192}"/>
               </a:ext>
             </a:extLst>
           </p:cNvPr>
@@ -4339,13 +4437,13 @@
               </a:ext>
             </a:extLst>
           </a:blip>
-          <a:srcRect l="13589" t="38351" r="25778" b="33883"/>
+          <a:srcRect l="13401" t="35000" r="25563" b="34167"/>
           <a:stretch/>
         </p:blipFill>
         <p:spPr>
           <a:xfrm>
-            <a:off x="5943" y="952107"/>
-            <a:ext cx="12186057" cy="4609707"/>
+            <a:off x="0" y="697582"/>
+            <a:ext cx="12192000" cy="5087639"/>
           </a:xfrm>
           <a:prstGeom prst="rect">
             <a:avLst/>
@@ -4384,10 +4482,10 @@
       </p:grpSpPr>
       <p:grpSp>
         <p:nvGrpSpPr>
-          <p:cNvPr id="9" name="Group 8">
-            <a:extLst>
-              <a:ext uri="{FF2B5EF4-FFF2-40B4-BE49-F238E27FC236}">
-                <a16:creationId xmlns:a16="http://schemas.microsoft.com/office/drawing/2014/main" id="{48E51BFD-330B-4378-AB3A-F25B60B6BC6D}"/>
+          <p:cNvPr id="14" name="Group 13">
+            <a:extLst>
+              <a:ext uri="{FF2B5EF4-FFF2-40B4-BE49-F238E27FC236}">
+                <a16:creationId xmlns:a16="http://schemas.microsoft.com/office/drawing/2014/main" id="{686152D1-A5FF-4E58-8EBA-1ED26008CA6A}"/>
               </a:ext>
             </a:extLst>
           </p:cNvPr>
@@ -4396,140 +4494,161 @@
         </p:nvGrpSpPr>
         <p:grpSpPr>
           <a:xfrm>
-            <a:off x="-3006262" y="-1034808"/>
-            <a:ext cx="17622624" cy="8406506"/>
-            <a:chOff x="-2244262" y="-821448"/>
-            <a:chExt cx="17622624" cy="8406506"/>
+            <a:off x="-2715312" y="-955810"/>
+            <a:ext cx="17622623" cy="8769619"/>
+            <a:chOff x="-3006261" y="-1034808"/>
+            <a:chExt cx="17622623" cy="8769619"/>
           </a:xfrm>
         </p:grpSpPr>
-        <p:sp>
-          <p:nvSpPr>
-            <p:cNvPr id="8" name="Rectangle 7">
+        <p:grpSp>
+          <p:nvGrpSpPr>
+            <p:cNvPr id="9" name="Group 8">
               <a:extLst>
                 <a:ext uri="{FF2B5EF4-FFF2-40B4-BE49-F238E27FC236}">
-                  <a16:creationId xmlns:a16="http://schemas.microsoft.com/office/drawing/2014/main" id="{42C11584-1177-497A-B8F7-80515164F94D}"/>
+                  <a16:creationId xmlns:a16="http://schemas.microsoft.com/office/drawing/2014/main" id="{48E51BFD-330B-4378-AB3A-F25B60B6BC6D}"/>
                 </a:ext>
               </a:extLst>
             </p:cNvPr>
-            <p:cNvSpPr/>
+            <p:cNvGrpSpPr/>
             <p:nvPr/>
-          </p:nvSpPr>
-          <p:spPr>
+          </p:nvGrpSpPr>
+          <p:grpSpPr>
             <a:xfrm>
-              <a:off x="-2244261" y="2368062"/>
-              <a:ext cx="17622623" cy="2485292"/>
+              <a:off x="-3006261" y="-1034808"/>
+              <a:ext cx="17622623" cy="5674802"/>
+              <a:chOff x="-2244261" y="-821448"/>
+              <a:chExt cx="17622623" cy="5674802"/>
             </a:xfrm>
-            <a:prstGeom prst="rect">
-              <a:avLst/>
-            </a:prstGeom>
-            <a:solidFill>
-              <a:schemeClr val="bg1"/>
-            </a:solidFill>
-            <a:ln>
-              <a:noFill/>
-            </a:ln>
-          </p:spPr>
-          <p:style>
-            <a:lnRef idx="2">
-              <a:schemeClr val="accent1">
-                <a:shade val="50000"/>
-              </a:schemeClr>
-            </a:lnRef>
-            <a:fillRef idx="1">
-              <a:schemeClr val="accent1"/>
-            </a:fillRef>
-            <a:effectRef idx="0">
-              <a:schemeClr val="accent1"/>
-            </a:effectRef>
-            <a:fontRef idx="minor">
-              <a:schemeClr val="lt1"/>
-            </a:fontRef>
-          </p:style>
-          <p:txBody>
-            <a:bodyPr rtlCol="0" anchor="ctr"/>
-            <a:lstStyle/>
-            <a:p>
-              <a:pPr algn="ctr"/>
-              <a:endParaRPr lang="en-US"/>
-            </a:p>
-          </p:txBody>
-        </p:sp>
+          </p:grpSpPr>
+          <p:sp>
+            <p:nvSpPr>
+              <p:cNvPr id="8" name="Rectangle 7">
+                <a:extLst>
+                  <a:ext uri="{FF2B5EF4-FFF2-40B4-BE49-F238E27FC236}">
+                    <a16:creationId xmlns:a16="http://schemas.microsoft.com/office/drawing/2014/main" id="{42C11584-1177-497A-B8F7-80515164F94D}"/>
+                  </a:ext>
+                </a:extLst>
+              </p:cNvPr>
+              <p:cNvSpPr/>
+              <p:nvPr/>
+            </p:nvSpPr>
+            <p:spPr>
+              <a:xfrm>
+                <a:off x="-2244261" y="2368062"/>
+                <a:ext cx="17622623" cy="2485292"/>
+              </a:xfrm>
+              <a:prstGeom prst="rect">
+                <a:avLst/>
+              </a:prstGeom>
+              <a:solidFill>
+                <a:schemeClr val="bg1"/>
+              </a:solidFill>
+              <a:ln>
+                <a:noFill/>
+              </a:ln>
+            </p:spPr>
+            <p:style>
+              <a:lnRef idx="2">
+                <a:schemeClr val="accent1">
+                  <a:shade val="50000"/>
+                </a:schemeClr>
+              </a:lnRef>
+              <a:fillRef idx="1">
+                <a:schemeClr val="accent1"/>
+              </a:fillRef>
+              <a:effectRef idx="0">
+                <a:schemeClr val="accent1"/>
+              </a:effectRef>
+              <a:fontRef idx="minor">
+                <a:schemeClr val="lt1"/>
+              </a:fontRef>
+            </p:style>
+            <p:txBody>
+              <a:bodyPr rtlCol="0" anchor="ctr"/>
+              <a:lstStyle/>
+              <a:p>
+                <a:pPr algn="ctr"/>
+                <a:endParaRPr lang="en-US"/>
+              </a:p>
+            </p:txBody>
+          </p:sp>
+          <p:pic>
+            <p:nvPicPr>
+              <p:cNvPr id="4" name="Picture 3" descr="Chart&#10;&#10;Description automatically generated">
+                <a:extLst>
+                  <a:ext uri="{FF2B5EF4-FFF2-40B4-BE49-F238E27FC236}">
+                    <a16:creationId xmlns:a16="http://schemas.microsoft.com/office/drawing/2014/main" id="{4AC55DCA-6B09-410B-B771-532FE7006952}"/>
+                  </a:ext>
+                </a:extLst>
+              </p:cNvPr>
+              <p:cNvPicPr>
+                <a:picLocks noChangeAspect="1"/>
+              </p:cNvPicPr>
+              <p:nvPr/>
+            </p:nvPicPr>
+            <p:blipFill rotWithShape="1">
+              <a:blip r:embed="rId2">
+                <a:extLst>
+                  <a:ext uri="{28A0092B-C50C-407E-A947-70E740481C1C}">
+                    <a14:useLocalDpi xmlns:a14="http://schemas.microsoft.com/office/drawing/2010/main" val="0"/>
+                  </a:ext>
+                </a:extLst>
+              </a:blip>
+              <a:srcRect l="27580" t="37799" r="24943" b="32945"/>
+              <a:stretch/>
+            </p:blipFill>
+            <p:spPr>
+              <a:xfrm>
+                <a:off x="-2244261" y="-816266"/>
+                <a:ext cx="8340261" cy="4245266"/>
+              </a:xfrm>
+              <a:prstGeom prst="rect">
+                <a:avLst/>
+              </a:prstGeom>
+            </p:spPr>
+          </p:pic>
+          <p:pic>
+            <p:nvPicPr>
+              <p:cNvPr id="6" name="Picture 5" descr="Chart, schematic&#10;&#10;Description automatically generated">
+                <a:extLst>
+                  <a:ext uri="{FF2B5EF4-FFF2-40B4-BE49-F238E27FC236}">
+                    <a16:creationId xmlns:a16="http://schemas.microsoft.com/office/drawing/2014/main" id="{F1F664B2-ACB2-42D0-8EC2-496D964288A7}"/>
+                  </a:ext>
+                </a:extLst>
+              </p:cNvPr>
+              <p:cNvPicPr>
+                <a:picLocks noChangeAspect="1"/>
+              </p:cNvPicPr>
+              <p:nvPr/>
+            </p:nvPicPr>
+            <p:blipFill rotWithShape="1">
+              <a:blip r:embed="rId3">
+                <a:extLst>
+                  <a:ext uri="{28A0092B-C50C-407E-A947-70E740481C1C}">
+                    <a14:useLocalDpi xmlns:a14="http://schemas.microsoft.com/office/drawing/2010/main" val="0"/>
+                  </a:ext>
+                </a:extLst>
+              </a:blip>
+              <a:srcRect l="19040" t="35601" r="25664" b="33746"/>
+              <a:stretch/>
+            </p:blipFill>
+            <p:spPr>
+              <a:xfrm>
+                <a:off x="6096000" y="-821448"/>
+                <a:ext cx="9282362" cy="4250448"/>
+              </a:xfrm>
+              <a:prstGeom prst="rect">
+                <a:avLst/>
+              </a:prstGeom>
+            </p:spPr>
+          </p:pic>
+        </p:grpSp>
         <p:pic>
           <p:nvPicPr>
-            <p:cNvPr id="4" name="Picture 3" descr="Chart&#10;&#10;Description automatically generated">
+            <p:cNvPr id="12" name="Picture 11" descr="Chart&#10;&#10;Description automatically generated">
               <a:extLst>
                 <a:ext uri="{FF2B5EF4-FFF2-40B4-BE49-F238E27FC236}">
-                  <a16:creationId xmlns:a16="http://schemas.microsoft.com/office/drawing/2014/main" id="{4AC55DCA-6B09-410B-B771-532FE7006952}"/>
-                </a:ext>
-              </a:extLst>
-            </p:cNvPr>
-            <p:cNvPicPr>
-              <a:picLocks noChangeAspect="1"/>
-            </p:cNvPicPr>
-            <p:nvPr/>
-          </p:nvPicPr>
-          <p:blipFill rotWithShape="1">
-            <a:blip r:embed="rId2">
-              <a:extLst>
-                <a:ext uri="{28A0092B-C50C-407E-A947-70E740481C1C}">
-                  <a14:useLocalDpi xmlns:a14="http://schemas.microsoft.com/office/drawing/2010/main" val="0"/>
-                </a:ext>
-              </a:extLst>
-            </a:blip>
-            <a:srcRect l="27580" t="37799" r="24943" b="32945"/>
-            <a:stretch/>
-          </p:blipFill>
-          <p:spPr>
-            <a:xfrm>
-              <a:off x="-2244261" y="-816266"/>
-              <a:ext cx="8340261" cy="4245266"/>
-            </a:xfrm>
-            <a:prstGeom prst="rect">
-              <a:avLst/>
-            </a:prstGeom>
-          </p:spPr>
-        </p:pic>
-        <p:pic>
-          <p:nvPicPr>
-            <p:cNvPr id="5" name="Picture 4" descr="Chart&#10;&#10;Description automatically generated">
-              <a:extLst>
-                <a:ext uri="{FF2B5EF4-FFF2-40B4-BE49-F238E27FC236}">
-                  <a16:creationId xmlns:a16="http://schemas.microsoft.com/office/drawing/2014/main" id="{E32DBD6E-BF57-4EDC-B029-E1555B49E770}"/>
-                </a:ext>
-              </a:extLst>
-            </p:cNvPr>
-            <p:cNvPicPr>
-              <a:picLocks noChangeAspect="1"/>
-            </p:cNvPicPr>
-            <p:nvPr/>
-          </p:nvPicPr>
-          <p:blipFill rotWithShape="1">
-            <a:blip r:embed="rId3">
-              <a:extLst>
-                <a:ext uri="{28A0092B-C50C-407E-A947-70E740481C1C}">
-                  <a14:useLocalDpi xmlns:a14="http://schemas.microsoft.com/office/drawing/2010/main" val="0"/>
-                </a:ext>
-              </a:extLst>
-            </a:blip>
-            <a:srcRect l="26940" t="38333" r="24186" b="33472"/>
-            <a:stretch/>
-          </p:blipFill>
-          <p:spPr>
-            <a:xfrm>
-              <a:off x="-2244262" y="3610708"/>
-              <a:ext cx="8340261" cy="3974350"/>
-            </a:xfrm>
-            <a:prstGeom prst="rect">
-              <a:avLst/>
-            </a:prstGeom>
-          </p:spPr>
-        </p:pic>
-        <p:pic>
-          <p:nvPicPr>
-            <p:cNvPr id="6" name="Picture 5" descr="Chart, schematic&#10;&#10;Description automatically generated">
-              <a:extLst>
-                <a:ext uri="{FF2B5EF4-FFF2-40B4-BE49-F238E27FC236}">
-                  <a16:creationId xmlns:a16="http://schemas.microsoft.com/office/drawing/2014/main" id="{F1F664B2-ACB2-42D0-8EC2-496D964288A7}"/>
+                  <a16:creationId xmlns:a16="http://schemas.microsoft.com/office/drawing/2014/main" id="{5642CCD2-1399-4B15-9D50-7D381ED941EF}"/>
                 </a:ext>
               </a:extLst>
             </p:cNvPr>
@@ -4546,13 +4665,13 @@
                 </a:ext>
               </a:extLst>
             </a:blip>
-            <a:srcRect l="19040" t="35601" r="25664" b="33746"/>
+            <a:srcRect l="26940" t="38333" r="24186" b="33472"/>
             <a:stretch/>
           </p:blipFill>
           <p:spPr>
             <a:xfrm>
-              <a:off x="6096000" y="-821448"/>
-              <a:ext cx="9282362" cy="4250448"/>
+              <a:off x="-3006261" y="3397348"/>
+              <a:ext cx="9102261" cy="4337463"/>
             </a:xfrm>
             <a:prstGeom prst="rect">
               <a:avLst/>
@@ -4561,10 +4680,10 @@
         </p:pic>
         <p:pic>
           <p:nvPicPr>
-            <p:cNvPr id="7" name="Picture 6" descr="Diagram, schematic&#10;&#10;Description automatically generated">
+            <p:cNvPr id="13" name="Picture 12">
               <a:extLst>
                 <a:ext uri="{FF2B5EF4-FFF2-40B4-BE49-F238E27FC236}">
-                  <a16:creationId xmlns:a16="http://schemas.microsoft.com/office/drawing/2014/main" id="{A9D0C9E3-DA78-491C-B893-E39E39B9CDD7}"/>
+                  <a16:creationId xmlns:a16="http://schemas.microsoft.com/office/drawing/2014/main" id="{9EA99AE4-2DC3-47E2-9A1C-A94A974B2295}"/>
                 </a:ext>
               </a:extLst>
             </p:cNvPr>
@@ -4581,13 +4700,13 @@
                 </a:ext>
               </a:extLst>
             </a:blip>
-            <a:srcRect l="13589" t="38351" r="25778" b="33883"/>
+            <a:srcRect l="13401" t="35000" r="25563" b="34167"/>
             <a:stretch/>
           </p:blipFill>
           <p:spPr>
             <a:xfrm>
-              <a:off x="6096656" y="4074001"/>
-              <a:ext cx="9281706" cy="3511057"/>
+              <a:off x="6096000" y="4179322"/>
+              <a:ext cx="8520362" cy="3555489"/>
             </a:xfrm>
             <a:prstGeom prst="rect">
               <a:avLst/>

</xml_diff>

<commit_message>
[FIX] lr growth, glucose and amino acids consumption rates
</commit_message>
<xml_diff>
--- a/plots/escher_maps.pptx
+++ b/plots/escher_maps.pptx
@@ -122,6 +122,7 @@
 <file path=ppt/revisionInfo.xml><?xml version="1.0" encoding="utf-8"?>
 <p1510:revInfo xmlns:a="http://schemas.openxmlformats.org/drawingml/2006/main" xmlns:r="http://schemas.openxmlformats.org/officeDocument/2006/relationships" xmlns:p1510="http://schemas.microsoft.com/office/powerpoint/2015/10/main">
   <p1510:revLst>
+    <p1510:client id="{F19EDF0D-D213-4F6C-B955-BA29C1AE8476}" v="2" dt="2020-12-17T15:26:18.270"/>
     <p1510:client id="{FE989250-A5F9-443C-B6A8-6F0DBE747987}" v="16" dt="2020-12-16T18:30:49.046"/>
   </p1510:revLst>
 </p1510:revInfo>
@@ -302,6 +303,77 @@
       </pc:sldChg>
     </pc:docChg>
   </pc:docChgLst>
+  <pc:docChgLst>
+    <pc:chgData name="Fernando João Pereira da Cruz" userId="afecf0b2-834d-400b-8e37-5233ba176018" providerId="ADAL" clId="{F19EDF0D-D213-4F6C-B955-BA29C1AE8476}"/>
+    <pc:docChg chg="custSel modSld">
+      <pc:chgData name="Fernando João Pereira da Cruz" userId="afecf0b2-834d-400b-8e37-5233ba176018" providerId="ADAL" clId="{F19EDF0D-D213-4F6C-B955-BA29C1AE8476}" dt="2020-12-17T15:27:15.177" v="19" actId="14100"/>
+      <pc:docMkLst>
+        <pc:docMk/>
+      </pc:docMkLst>
+      <pc:sldChg chg="addSp delSp modSp mod">
+        <pc:chgData name="Fernando João Pereira da Cruz" userId="afecf0b2-834d-400b-8e37-5233ba176018" providerId="ADAL" clId="{F19EDF0D-D213-4F6C-B955-BA29C1AE8476}" dt="2020-12-17T15:26:06.924" v="9" actId="14100"/>
+        <pc:sldMkLst>
+          <pc:docMk/>
+          <pc:sldMk cId="2733214702" sldId="259"/>
+        </pc:sldMkLst>
+        <pc:picChg chg="del">
+          <ac:chgData name="Fernando João Pereira da Cruz" userId="afecf0b2-834d-400b-8e37-5233ba176018" providerId="ADAL" clId="{F19EDF0D-D213-4F6C-B955-BA29C1AE8476}" dt="2020-12-17T15:25:08.131" v="0" actId="478"/>
+          <ac:picMkLst>
+            <pc:docMk/>
+            <pc:sldMk cId="2733214702" sldId="259"/>
+            <ac:picMk id="3" creationId="{AA06AE88-62F3-4C10-9A8A-8969D4FF4192}"/>
+          </ac:picMkLst>
+        </pc:picChg>
+        <pc:picChg chg="add mod modCrop">
+          <ac:chgData name="Fernando João Pereira da Cruz" userId="afecf0b2-834d-400b-8e37-5233ba176018" providerId="ADAL" clId="{F19EDF0D-D213-4F6C-B955-BA29C1AE8476}" dt="2020-12-17T15:26:06.924" v="9" actId="14100"/>
+          <ac:picMkLst>
+            <pc:docMk/>
+            <pc:sldMk cId="2733214702" sldId="259"/>
+            <ac:picMk id="4" creationId="{B0B62CA3-E9B1-4E36-80D9-93B8114EC4E7}"/>
+          </ac:picMkLst>
+        </pc:picChg>
+      </pc:sldChg>
+      <pc:sldChg chg="addSp delSp modSp mod">
+        <pc:chgData name="Fernando João Pereira da Cruz" userId="afecf0b2-834d-400b-8e37-5233ba176018" providerId="ADAL" clId="{F19EDF0D-D213-4F6C-B955-BA29C1AE8476}" dt="2020-12-17T15:27:15.177" v="19" actId="14100"/>
+        <pc:sldMkLst>
+          <pc:docMk/>
+          <pc:sldMk cId="1674768841" sldId="260"/>
+        </pc:sldMkLst>
+        <pc:spChg chg="mod">
+          <ac:chgData name="Fernando João Pereira da Cruz" userId="afecf0b2-834d-400b-8e37-5233ba176018" providerId="ADAL" clId="{F19EDF0D-D213-4F6C-B955-BA29C1AE8476}" dt="2020-12-17T15:27:15.177" v="19" actId="14100"/>
+          <ac:spMkLst>
+            <pc:docMk/>
+            <pc:sldMk cId="1674768841" sldId="260"/>
+            <ac:spMk id="8" creationId="{42C11584-1177-497A-B8F7-80515164F94D}"/>
+          </ac:spMkLst>
+        </pc:spChg>
+        <pc:picChg chg="mod">
+          <ac:chgData name="Fernando João Pereira da Cruz" userId="afecf0b2-834d-400b-8e37-5233ba176018" providerId="ADAL" clId="{F19EDF0D-D213-4F6C-B955-BA29C1AE8476}" dt="2020-12-17T15:27:12.352" v="18" actId="14100"/>
+          <ac:picMkLst>
+            <pc:docMk/>
+            <pc:sldMk cId="1674768841" sldId="260"/>
+            <ac:picMk id="6" creationId="{F1F664B2-ACB2-42D0-8EC2-496D964288A7}"/>
+          </ac:picMkLst>
+        </pc:picChg>
+        <pc:picChg chg="add mod">
+          <ac:chgData name="Fernando João Pereira da Cruz" userId="afecf0b2-834d-400b-8e37-5233ba176018" providerId="ADAL" clId="{F19EDF0D-D213-4F6C-B955-BA29C1AE8476}" dt="2020-12-17T15:27:09.159" v="17" actId="14100"/>
+          <ac:picMkLst>
+            <pc:docMk/>
+            <pc:sldMk cId="1674768841" sldId="260"/>
+            <ac:picMk id="10" creationId="{13173B06-249E-4C05-BA7B-47ED23B302AC}"/>
+          </ac:picMkLst>
+        </pc:picChg>
+        <pc:picChg chg="del">
+          <ac:chgData name="Fernando João Pereira da Cruz" userId="afecf0b2-834d-400b-8e37-5233ba176018" providerId="ADAL" clId="{F19EDF0D-D213-4F6C-B955-BA29C1AE8476}" dt="2020-12-17T15:26:17.913" v="10" actId="478"/>
+          <ac:picMkLst>
+            <pc:docMk/>
+            <pc:sldMk cId="1674768841" sldId="260"/>
+            <ac:picMk id="13" creationId="{9EA99AE4-2DC3-47E2-9A1C-A94A974B2295}"/>
+          </ac:picMkLst>
+        </pc:picChg>
+      </pc:sldChg>
+    </pc:docChg>
+  </pc:docChgLst>
 </pc:chgInfo>
 </file>
 
@@ -387,7 +459,7 @@
           <a:p>
             <a:fld id="{ADA091C0-E40B-415E-9633-18DCDD606E35}" type="datetimeFigureOut">
               <a:rPr lang="en-US" smtClean="0"/>
-              <a:t>12/16/2020</a:t>
+              <a:t>12/17/2020</a:t>
             </a:fld>
             <a:endParaRPr lang="en-US"/>
           </a:p>
@@ -1153,7 +1225,7 @@
           <a:p>
             <a:fld id="{E7133E4F-4AC7-4A3A-B48E-59A8418D99DB}" type="datetimeFigureOut">
               <a:rPr lang="en-US" smtClean="0"/>
-              <a:t>12/16/2020</a:t>
+              <a:t>12/17/2020</a:t>
             </a:fld>
             <a:endParaRPr lang="en-US"/>
           </a:p>
@@ -1351,7 +1423,7 @@
           <a:p>
             <a:fld id="{E7133E4F-4AC7-4A3A-B48E-59A8418D99DB}" type="datetimeFigureOut">
               <a:rPr lang="en-US" smtClean="0"/>
-              <a:t>12/16/2020</a:t>
+              <a:t>12/17/2020</a:t>
             </a:fld>
             <a:endParaRPr lang="en-US"/>
           </a:p>
@@ -1559,7 +1631,7 @@
           <a:p>
             <a:fld id="{E7133E4F-4AC7-4A3A-B48E-59A8418D99DB}" type="datetimeFigureOut">
               <a:rPr lang="en-US" smtClean="0"/>
-              <a:t>12/16/2020</a:t>
+              <a:t>12/17/2020</a:t>
             </a:fld>
             <a:endParaRPr lang="en-US"/>
           </a:p>
@@ -1757,7 +1829,7 @@
           <a:p>
             <a:fld id="{E7133E4F-4AC7-4A3A-B48E-59A8418D99DB}" type="datetimeFigureOut">
               <a:rPr lang="en-US" smtClean="0"/>
-              <a:t>12/16/2020</a:t>
+              <a:t>12/17/2020</a:t>
             </a:fld>
             <a:endParaRPr lang="en-US"/>
           </a:p>
@@ -2032,7 +2104,7 @@
           <a:p>
             <a:fld id="{E7133E4F-4AC7-4A3A-B48E-59A8418D99DB}" type="datetimeFigureOut">
               <a:rPr lang="en-US" smtClean="0"/>
-              <a:t>12/16/2020</a:t>
+              <a:t>12/17/2020</a:t>
             </a:fld>
             <a:endParaRPr lang="en-US"/>
           </a:p>
@@ -2297,7 +2369,7 @@
           <a:p>
             <a:fld id="{E7133E4F-4AC7-4A3A-B48E-59A8418D99DB}" type="datetimeFigureOut">
               <a:rPr lang="en-US" smtClean="0"/>
-              <a:t>12/16/2020</a:t>
+              <a:t>12/17/2020</a:t>
             </a:fld>
             <a:endParaRPr lang="en-US"/>
           </a:p>
@@ -2709,7 +2781,7 @@
           <a:p>
             <a:fld id="{E7133E4F-4AC7-4A3A-B48E-59A8418D99DB}" type="datetimeFigureOut">
               <a:rPr lang="en-US" smtClean="0"/>
-              <a:t>12/16/2020</a:t>
+              <a:t>12/17/2020</a:t>
             </a:fld>
             <a:endParaRPr lang="en-US"/>
           </a:p>
@@ -2850,7 +2922,7 @@
           <a:p>
             <a:fld id="{E7133E4F-4AC7-4A3A-B48E-59A8418D99DB}" type="datetimeFigureOut">
               <a:rPr lang="en-US" smtClean="0"/>
-              <a:t>12/16/2020</a:t>
+              <a:t>12/17/2020</a:t>
             </a:fld>
             <a:endParaRPr lang="en-US"/>
           </a:p>
@@ -2963,7 +3035,7 @@
           <a:p>
             <a:fld id="{E7133E4F-4AC7-4A3A-B48E-59A8418D99DB}" type="datetimeFigureOut">
               <a:rPr lang="en-US" smtClean="0"/>
-              <a:t>12/16/2020</a:t>
+              <a:t>12/17/2020</a:t>
             </a:fld>
             <a:endParaRPr lang="en-US"/>
           </a:p>
@@ -3274,7 +3346,7 @@
           <a:p>
             <a:fld id="{E7133E4F-4AC7-4A3A-B48E-59A8418D99DB}" type="datetimeFigureOut">
               <a:rPr lang="en-US" smtClean="0"/>
-              <a:t>12/16/2020</a:t>
+              <a:t>12/17/2020</a:t>
             </a:fld>
             <a:endParaRPr lang="en-US"/>
           </a:p>
@@ -3562,7 +3634,7 @@
           <a:p>
             <a:fld id="{E7133E4F-4AC7-4A3A-B48E-59A8418D99DB}" type="datetimeFigureOut">
               <a:rPr lang="en-US" smtClean="0"/>
-              <a:t>12/16/2020</a:t>
+              <a:t>12/17/2020</a:t>
             </a:fld>
             <a:endParaRPr lang="en-US"/>
           </a:p>
@@ -3803,7 +3875,7 @@
           <a:p>
             <a:fld id="{E7133E4F-4AC7-4A3A-B48E-59A8418D99DB}" type="datetimeFigureOut">
               <a:rPr lang="en-US" smtClean="0"/>
-              <a:t>12/16/2020</a:t>
+              <a:t>12/17/2020</a:t>
             </a:fld>
             <a:endParaRPr lang="en-US"/>
           </a:p>
@@ -4417,10 +4489,10 @@
       </p:grpSpPr>
       <p:pic>
         <p:nvPicPr>
-          <p:cNvPr id="3" name="Picture 2">
-            <a:extLst>
-              <a:ext uri="{FF2B5EF4-FFF2-40B4-BE49-F238E27FC236}">
-                <a16:creationId xmlns:a16="http://schemas.microsoft.com/office/drawing/2014/main" id="{AA06AE88-62F3-4C10-9A8A-8969D4FF4192}"/>
+          <p:cNvPr id="4" name="Picture 3" descr="Diagram, schematic&#10;&#10;Description automatically generated">
+            <a:extLst>
+              <a:ext uri="{FF2B5EF4-FFF2-40B4-BE49-F238E27FC236}">
+                <a16:creationId xmlns:a16="http://schemas.microsoft.com/office/drawing/2014/main" id="{B0B62CA3-E9B1-4E36-80D9-93B8114EC4E7}"/>
               </a:ext>
             </a:extLst>
           </p:cNvPr>
@@ -4437,13 +4509,13 @@
               </a:ext>
             </a:extLst>
           </a:blip>
-          <a:srcRect l="13401" t="35000" r="25563" b="34167"/>
+          <a:srcRect l="13655" t="35111" r="25622" b="34133"/>
           <a:stretch/>
         </p:blipFill>
         <p:spPr>
           <a:xfrm>
-            <a:off x="0" y="697582"/>
-            <a:ext cx="12192000" cy="5087639"/>
+            <a:off x="-1" y="0"/>
+            <a:ext cx="12190649" cy="5100320"/>
           </a:xfrm>
           <a:prstGeom prst="rect">
             <a:avLst/>
@@ -4494,10 +4566,10 @@
         </p:nvGrpSpPr>
         <p:grpSpPr>
           <a:xfrm>
-            <a:off x="-2715312" y="-955810"/>
-            <a:ext cx="17622623" cy="8769619"/>
-            <a:chOff x="-3006261" y="-1034808"/>
-            <a:chExt cx="17622623" cy="8769619"/>
+            <a:off x="-2715312" y="-955811"/>
+            <a:ext cx="18307797" cy="8769620"/>
+            <a:chOff x="-3006261" y="-1034809"/>
+            <a:chExt cx="18307797" cy="8769620"/>
           </a:xfrm>
         </p:grpSpPr>
         <p:grpSp>
@@ -4514,10 +4586,10 @@
           </p:nvGrpSpPr>
           <p:grpSpPr>
             <a:xfrm>
-              <a:off x="-3006261" y="-1034808"/>
-              <a:ext cx="17622623" cy="5674802"/>
-              <a:chOff x="-2244261" y="-821448"/>
-              <a:chExt cx="17622623" cy="5674802"/>
+              <a:off x="-3006261" y="-1034809"/>
+              <a:ext cx="18307797" cy="5674803"/>
+              <a:chOff x="-2244261" y="-821449"/>
+              <a:chExt cx="18307797" cy="5674803"/>
             </a:xfrm>
           </p:grpSpPr>
           <p:sp>
@@ -4535,7 +4607,7 @@
             <p:spPr>
               <a:xfrm>
                 <a:off x="-2244261" y="2368062"/>
-                <a:ext cx="17622623" cy="2485292"/>
+                <a:ext cx="18307797" cy="2485292"/>
               </a:xfrm>
               <a:prstGeom prst="rect">
                 <a:avLst/>
@@ -4634,8 +4706,8 @@
             </p:blipFill>
             <p:spPr>
               <a:xfrm>
-                <a:off x="6096000" y="-821448"/>
-                <a:ext cx="9282362" cy="4250448"/>
+                <a:off x="6095999" y="-821449"/>
+                <a:ext cx="9967537" cy="4564193"/>
               </a:xfrm>
               <a:prstGeom prst="rect">
                 <a:avLst/>
@@ -4678,42 +4750,42 @@
             </a:prstGeom>
           </p:spPr>
         </p:pic>
-        <p:pic>
-          <p:nvPicPr>
-            <p:cNvPr id="13" name="Picture 12">
-              <a:extLst>
-                <a:ext uri="{FF2B5EF4-FFF2-40B4-BE49-F238E27FC236}">
-                  <a16:creationId xmlns:a16="http://schemas.microsoft.com/office/drawing/2014/main" id="{9EA99AE4-2DC3-47E2-9A1C-A94A974B2295}"/>
-                </a:ext>
-              </a:extLst>
-            </p:cNvPr>
-            <p:cNvPicPr>
-              <a:picLocks noChangeAspect="1"/>
-            </p:cNvPicPr>
-            <p:nvPr/>
-          </p:nvPicPr>
-          <p:blipFill rotWithShape="1">
-            <a:blip r:embed="rId5">
-              <a:extLst>
-                <a:ext uri="{28A0092B-C50C-407E-A947-70E740481C1C}">
-                  <a14:useLocalDpi xmlns:a14="http://schemas.microsoft.com/office/drawing/2010/main" val="0"/>
-                </a:ext>
-              </a:extLst>
-            </a:blip>
-            <a:srcRect l="13401" t="35000" r="25563" b="34167"/>
-            <a:stretch/>
-          </p:blipFill>
-          <p:spPr>
-            <a:xfrm>
-              <a:off x="6096000" y="4179322"/>
-              <a:ext cx="8520362" cy="3555489"/>
-            </a:xfrm>
-            <a:prstGeom prst="rect">
-              <a:avLst/>
-            </a:prstGeom>
-          </p:spPr>
-        </p:pic>
       </p:grpSp>
+      <p:pic>
+        <p:nvPicPr>
+          <p:cNvPr id="10" name="Picture 9" descr="Diagram, schematic&#10;&#10;Description automatically generated">
+            <a:extLst>
+              <a:ext uri="{FF2B5EF4-FFF2-40B4-BE49-F238E27FC236}">
+                <a16:creationId xmlns:a16="http://schemas.microsoft.com/office/drawing/2014/main" id="{13173B06-249E-4C05-BA7B-47ED23B302AC}"/>
+              </a:ext>
+            </a:extLst>
+          </p:cNvPr>
+          <p:cNvPicPr>
+            <a:picLocks noChangeAspect="1"/>
+          </p:cNvPicPr>
+          <p:nvPr/>
+        </p:nvPicPr>
+        <p:blipFill rotWithShape="1">
+          <a:blip r:embed="rId5">
+            <a:extLst>
+              <a:ext uri="{28A0092B-C50C-407E-A947-70E740481C1C}">
+                <a14:useLocalDpi xmlns:a14="http://schemas.microsoft.com/office/drawing/2010/main" val="0"/>
+              </a:ext>
+            </a:extLst>
+          </a:blip>
+          <a:srcRect l="13655" t="35111" r="25622" b="34133"/>
+          <a:stretch/>
+        </p:blipFill>
+        <p:spPr>
+          <a:xfrm>
+            <a:off x="6386949" y="3962399"/>
+            <a:ext cx="9205536" cy="3851409"/>
+          </a:xfrm>
+          <a:prstGeom prst="rect">
+            <a:avLst/>
+          </a:prstGeom>
+        </p:spPr>
+      </p:pic>
     </p:spTree>
     <p:extLst>
       <p:ext uri="{BB962C8B-B14F-4D97-AF65-F5344CB8AC3E}">

</xml_diff>

<commit_message>
[FIX] escher map fix
</commit_message>
<xml_diff>
--- a/plots/escher_maps.pptx
+++ b/plots/escher_maps.pptx
@@ -122,7 +122,7 @@
 <file path=ppt/revisionInfo.xml><?xml version="1.0" encoding="utf-8"?>
 <p1510:revInfo xmlns:a="http://schemas.openxmlformats.org/drawingml/2006/main" xmlns:r="http://schemas.openxmlformats.org/officeDocument/2006/relationships" xmlns:p1510="http://schemas.microsoft.com/office/powerpoint/2015/10/main">
   <p1510:revLst>
-    <p1510:client id="{F19EDF0D-D213-4F6C-B955-BA29C1AE8476}" v="2" dt="2020-12-17T15:26:18.270"/>
+    <p1510:client id="{F19EDF0D-D213-4F6C-B955-BA29C1AE8476}" v="3" dt="2020-12-17T17:48:45.721"/>
     <p1510:client id="{FE989250-A5F9-443C-B6A8-6F0DBE747987}" v="16" dt="2020-12-16T18:30:49.046"/>
   </p1510:revLst>
 </p1510:revInfo>
@@ -306,7 +306,7 @@
   <pc:docChgLst>
     <pc:chgData name="Fernando João Pereira da Cruz" userId="afecf0b2-834d-400b-8e37-5233ba176018" providerId="ADAL" clId="{F19EDF0D-D213-4F6C-B955-BA29C1AE8476}"/>
     <pc:docChg chg="custSel modSld">
-      <pc:chgData name="Fernando João Pereira da Cruz" userId="afecf0b2-834d-400b-8e37-5233ba176018" providerId="ADAL" clId="{F19EDF0D-D213-4F6C-B955-BA29C1AE8476}" dt="2020-12-17T15:27:15.177" v="19" actId="14100"/>
+      <pc:chgData name="Fernando João Pereira da Cruz" userId="afecf0b2-834d-400b-8e37-5233ba176018" providerId="ADAL" clId="{F19EDF0D-D213-4F6C-B955-BA29C1AE8476}" dt="2020-12-17T17:48:47.320" v="21" actId="1036"/>
       <pc:docMkLst>
         <pc:docMk/>
       </pc:docMkLst>
@@ -334,7 +334,7 @@
         </pc:picChg>
       </pc:sldChg>
       <pc:sldChg chg="addSp delSp modSp mod">
-        <pc:chgData name="Fernando João Pereira da Cruz" userId="afecf0b2-834d-400b-8e37-5233ba176018" providerId="ADAL" clId="{F19EDF0D-D213-4F6C-B955-BA29C1AE8476}" dt="2020-12-17T15:27:15.177" v="19" actId="14100"/>
+        <pc:chgData name="Fernando João Pereira da Cruz" userId="afecf0b2-834d-400b-8e37-5233ba176018" providerId="ADAL" clId="{F19EDF0D-D213-4F6C-B955-BA29C1AE8476}" dt="2020-12-17T17:48:47.320" v="21" actId="1036"/>
         <pc:sldMkLst>
           <pc:docMk/>
           <pc:sldMk cId="1674768841" sldId="260"/>
@@ -347,8 +347,24 @@
             <ac:spMk id="8" creationId="{42C11584-1177-497A-B8F7-80515164F94D}"/>
           </ac:spMkLst>
         </pc:spChg>
+        <pc:grpChg chg="add mod">
+          <ac:chgData name="Fernando João Pereira da Cruz" userId="afecf0b2-834d-400b-8e37-5233ba176018" providerId="ADAL" clId="{F19EDF0D-D213-4F6C-B955-BA29C1AE8476}" dt="2020-12-17T17:48:45.720" v="20" actId="164"/>
+          <ac:grpSpMkLst>
+            <pc:docMk/>
+            <pc:sldMk cId="1674768841" sldId="260"/>
+            <ac:grpSpMk id="2" creationId="{6E8ECA7E-1F87-46AE-8A41-1E4E94DFC3A7}"/>
+          </ac:grpSpMkLst>
+        </pc:grpChg>
+        <pc:grpChg chg="mod">
+          <ac:chgData name="Fernando João Pereira da Cruz" userId="afecf0b2-834d-400b-8e37-5233ba176018" providerId="ADAL" clId="{F19EDF0D-D213-4F6C-B955-BA29C1AE8476}" dt="2020-12-17T17:48:45.720" v="20" actId="164"/>
+          <ac:grpSpMkLst>
+            <pc:docMk/>
+            <pc:sldMk cId="1674768841" sldId="260"/>
+            <ac:grpSpMk id="14" creationId="{686152D1-A5FF-4E58-8EBA-1ED26008CA6A}"/>
+          </ac:grpSpMkLst>
+        </pc:grpChg>
         <pc:picChg chg="mod">
-          <ac:chgData name="Fernando João Pereira da Cruz" userId="afecf0b2-834d-400b-8e37-5233ba176018" providerId="ADAL" clId="{F19EDF0D-D213-4F6C-B955-BA29C1AE8476}" dt="2020-12-17T15:27:12.352" v="18" actId="14100"/>
+          <ac:chgData name="Fernando João Pereira da Cruz" userId="afecf0b2-834d-400b-8e37-5233ba176018" providerId="ADAL" clId="{F19EDF0D-D213-4F6C-B955-BA29C1AE8476}" dt="2020-12-17T17:48:47.320" v="21" actId="1036"/>
           <ac:picMkLst>
             <pc:docMk/>
             <pc:sldMk cId="1674768841" sldId="260"/>
@@ -356,7 +372,7 @@
           </ac:picMkLst>
         </pc:picChg>
         <pc:picChg chg="add mod">
-          <ac:chgData name="Fernando João Pereira da Cruz" userId="afecf0b2-834d-400b-8e37-5233ba176018" providerId="ADAL" clId="{F19EDF0D-D213-4F6C-B955-BA29C1AE8476}" dt="2020-12-17T15:27:09.159" v="17" actId="14100"/>
+          <ac:chgData name="Fernando João Pereira da Cruz" userId="afecf0b2-834d-400b-8e37-5233ba176018" providerId="ADAL" clId="{F19EDF0D-D213-4F6C-B955-BA29C1AE8476}" dt="2020-12-17T17:48:45.720" v="20" actId="164"/>
           <ac:picMkLst>
             <pc:docMk/>
             <pc:sldMk cId="1674768841" sldId="260"/>
@@ -4554,10 +4570,10 @@
       </p:grpSpPr>
       <p:grpSp>
         <p:nvGrpSpPr>
-          <p:cNvPr id="14" name="Group 13">
-            <a:extLst>
-              <a:ext uri="{FF2B5EF4-FFF2-40B4-BE49-F238E27FC236}">
-                <a16:creationId xmlns:a16="http://schemas.microsoft.com/office/drawing/2014/main" id="{686152D1-A5FF-4E58-8EBA-1ED26008CA6A}"/>
+          <p:cNvPr id="2" name="Group 1">
+            <a:extLst>
+              <a:ext uri="{FF2B5EF4-FFF2-40B4-BE49-F238E27FC236}">
+                <a16:creationId xmlns:a16="http://schemas.microsoft.com/office/drawing/2014/main" id="{6E8ECA7E-1F87-46AE-8A41-1E4E94DFC3A7}"/>
               </a:ext>
             </a:extLst>
           </p:cNvPr>
@@ -4566,18 +4582,18 @@
         </p:nvGrpSpPr>
         <p:grpSpPr>
           <a:xfrm>
-            <a:off x="-2715312" y="-955811"/>
-            <a:ext cx="18307797" cy="8769620"/>
-            <a:chOff x="-3006261" y="-1034809"/>
-            <a:chExt cx="18307797" cy="8769620"/>
+            <a:off x="-2715312" y="-950628"/>
+            <a:ext cx="18307797" cy="8764437"/>
+            <a:chOff x="-2715312" y="-950628"/>
+            <a:chExt cx="18307797" cy="8764437"/>
           </a:xfrm>
         </p:grpSpPr>
         <p:grpSp>
           <p:nvGrpSpPr>
-            <p:cNvPr id="9" name="Group 8">
+            <p:cNvPr id="14" name="Group 13">
               <a:extLst>
                 <a:ext uri="{FF2B5EF4-FFF2-40B4-BE49-F238E27FC236}">
-                  <a16:creationId xmlns:a16="http://schemas.microsoft.com/office/drawing/2014/main" id="{48E51BFD-330B-4378-AB3A-F25B60B6BC6D}"/>
+                  <a16:creationId xmlns:a16="http://schemas.microsoft.com/office/drawing/2014/main" id="{686152D1-A5FF-4E58-8EBA-1ED26008CA6A}"/>
                 </a:ext>
               </a:extLst>
             </p:cNvPr>
@@ -4586,70 +4602,161 @@
           </p:nvGrpSpPr>
           <p:grpSpPr>
             <a:xfrm>
-              <a:off x="-3006261" y="-1034809"/>
-              <a:ext cx="18307797" cy="5674803"/>
-              <a:chOff x="-2244261" y="-821449"/>
-              <a:chExt cx="18307797" cy="5674803"/>
+              <a:off x="-2715312" y="-950628"/>
+              <a:ext cx="18307797" cy="8764437"/>
+              <a:chOff x="-3006261" y="-1029626"/>
+              <a:chExt cx="18307797" cy="8764437"/>
             </a:xfrm>
           </p:grpSpPr>
-          <p:sp>
-            <p:nvSpPr>
-              <p:cNvPr id="8" name="Rectangle 7">
+          <p:grpSp>
+            <p:nvGrpSpPr>
+              <p:cNvPr id="9" name="Group 8">
                 <a:extLst>
                   <a:ext uri="{FF2B5EF4-FFF2-40B4-BE49-F238E27FC236}">
-                    <a16:creationId xmlns:a16="http://schemas.microsoft.com/office/drawing/2014/main" id="{42C11584-1177-497A-B8F7-80515164F94D}"/>
+                    <a16:creationId xmlns:a16="http://schemas.microsoft.com/office/drawing/2014/main" id="{48E51BFD-330B-4378-AB3A-F25B60B6BC6D}"/>
                   </a:ext>
                 </a:extLst>
               </p:cNvPr>
-              <p:cNvSpPr/>
+              <p:cNvGrpSpPr/>
               <p:nvPr/>
-            </p:nvSpPr>
-            <p:spPr>
+            </p:nvGrpSpPr>
+            <p:grpSpPr>
               <a:xfrm>
-                <a:off x="-2244261" y="2368062"/>
-                <a:ext cx="18307797" cy="2485292"/>
+                <a:off x="-3006261" y="-1029626"/>
+                <a:ext cx="18307797" cy="5669620"/>
+                <a:chOff x="-2244261" y="-816266"/>
+                <a:chExt cx="18307797" cy="5669620"/>
               </a:xfrm>
-              <a:prstGeom prst="rect">
-                <a:avLst/>
-              </a:prstGeom>
-              <a:solidFill>
-                <a:schemeClr val="bg1"/>
-              </a:solidFill>
-              <a:ln>
-                <a:noFill/>
-              </a:ln>
-            </p:spPr>
-            <p:style>
-              <a:lnRef idx="2">
-                <a:schemeClr val="accent1">
-                  <a:shade val="50000"/>
-                </a:schemeClr>
-              </a:lnRef>
-              <a:fillRef idx="1">
-                <a:schemeClr val="accent1"/>
-              </a:fillRef>
-              <a:effectRef idx="0">
-                <a:schemeClr val="accent1"/>
-              </a:effectRef>
-              <a:fontRef idx="minor">
-                <a:schemeClr val="lt1"/>
-              </a:fontRef>
-            </p:style>
-            <p:txBody>
-              <a:bodyPr rtlCol="0" anchor="ctr"/>
-              <a:lstStyle/>
-              <a:p>
-                <a:pPr algn="ctr"/>
-                <a:endParaRPr lang="en-US"/>
-              </a:p>
-            </p:txBody>
-          </p:sp>
+            </p:grpSpPr>
+            <p:sp>
+              <p:nvSpPr>
+                <p:cNvPr id="8" name="Rectangle 7">
+                  <a:extLst>
+                    <a:ext uri="{FF2B5EF4-FFF2-40B4-BE49-F238E27FC236}">
+                      <a16:creationId xmlns:a16="http://schemas.microsoft.com/office/drawing/2014/main" id="{42C11584-1177-497A-B8F7-80515164F94D}"/>
+                    </a:ext>
+                  </a:extLst>
+                </p:cNvPr>
+                <p:cNvSpPr/>
+                <p:nvPr/>
+              </p:nvSpPr>
+              <p:spPr>
+                <a:xfrm>
+                  <a:off x="-2244261" y="2368062"/>
+                  <a:ext cx="18307797" cy="2485292"/>
+                </a:xfrm>
+                <a:prstGeom prst="rect">
+                  <a:avLst/>
+                </a:prstGeom>
+                <a:solidFill>
+                  <a:schemeClr val="bg1"/>
+                </a:solidFill>
+                <a:ln>
+                  <a:noFill/>
+                </a:ln>
+              </p:spPr>
+              <p:style>
+                <a:lnRef idx="2">
+                  <a:schemeClr val="accent1">
+                    <a:shade val="50000"/>
+                  </a:schemeClr>
+                </a:lnRef>
+                <a:fillRef idx="1">
+                  <a:schemeClr val="accent1"/>
+                </a:fillRef>
+                <a:effectRef idx="0">
+                  <a:schemeClr val="accent1"/>
+                </a:effectRef>
+                <a:fontRef idx="minor">
+                  <a:schemeClr val="lt1"/>
+                </a:fontRef>
+              </p:style>
+              <p:txBody>
+                <a:bodyPr rtlCol="0" anchor="ctr"/>
+                <a:lstStyle/>
+                <a:p>
+                  <a:pPr algn="ctr"/>
+                  <a:endParaRPr lang="en-US"/>
+                </a:p>
+              </p:txBody>
+            </p:sp>
+            <p:pic>
+              <p:nvPicPr>
+                <p:cNvPr id="4" name="Picture 3" descr="Chart&#10;&#10;Description automatically generated">
+                  <a:extLst>
+                    <a:ext uri="{FF2B5EF4-FFF2-40B4-BE49-F238E27FC236}">
+                      <a16:creationId xmlns:a16="http://schemas.microsoft.com/office/drawing/2014/main" id="{4AC55DCA-6B09-410B-B771-532FE7006952}"/>
+                    </a:ext>
+                  </a:extLst>
+                </p:cNvPr>
+                <p:cNvPicPr>
+                  <a:picLocks noChangeAspect="1"/>
+                </p:cNvPicPr>
+                <p:nvPr/>
+              </p:nvPicPr>
+              <p:blipFill rotWithShape="1">
+                <a:blip r:embed="rId2">
+                  <a:extLst>
+                    <a:ext uri="{28A0092B-C50C-407E-A947-70E740481C1C}">
+                      <a14:useLocalDpi xmlns:a14="http://schemas.microsoft.com/office/drawing/2010/main" val="0"/>
+                    </a:ext>
+                  </a:extLst>
+                </a:blip>
+                <a:srcRect l="27580" t="37799" r="24943" b="32945"/>
+                <a:stretch/>
+              </p:blipFill>
+              <p:spPr>
+                <a:xfrm>
+                  <a:off x="-2244261" y="-816266"/>
+                  <a:ext cx="8340261" cy="4245266"/>
+                </a:xfrm>
+                <a:prstGeom prst="rect">
+                  <a:avLst/>
+                </a:prstGeom>
+              </p:spPr>
+            </p:pic>
+            <p:pic>
+              <p:nvPicPr>
+                <p:cNvPr id="6" name="Picture 5" descr="Chart, schematic&#10;&#10;Description automatically generated">
+                  <a:extLst>
+                    <a:ext uri="{FF2B5EF4-FFF2-40B4-BE49-F238E27FC236}">
+                      <a16:creationId xmlns:a16="http://schemas.microsoft.com/office/drawing/2014/main" id="{F1F664B2-ACB2-42D0-8EC2-496D964288A7}"/>
+                    </a:ext>
+                  </a:extLst>
+                </p:cNvPr>
+                <p:cNvPicPr>
+                  <a:picLocks noChangeAspect="1"/>
+                </p:cNvPicPr>
+                <p:nvPr/>
+              </p:nvPicPr>
+              <p:blipFill rotWithShape="1">
+                <a:blip r:embed="rId3">
+                  <a:extLst>
+                    <a:ext uri="{28A0092B-C50C-407E-A947-70E740481C1C}">
+                      <a14:useLocalDpi xmlns:a14="http://schemas.microsoft.com/office/drawing/2010/main" val="0"/>
+                    </a:ext>
+                  </a:extLst>
+                </a:blip>
+                <a:srcRect l="19040" t="35601" r="25664" b="33746"/>
+                <a:stretch/>
+              </p:blipFill>
+              <p:spPr>
+                <a:xfrm>
+                  <a:off x="6095999" y="-806209"/>
+                  <a:ext cx="9967537" cy="4564193"/>
+                </a:xfrm>
+                <a:prstGeom prst="rect">
+                  <a:avLst/>
+                </a:prstGeom>
+              </p:spPr>
+            </p:pic>
+          </p:grpSp>
           <p:pic>
             <p:nvPicPr>
-              <p:cNvPr id="4" name="Picture 3" descr="Chart&#10;&#10;Description automatically generated">
+              <p:cNvPr id="12" name="Picture 11" descr="Chart&#10;&#10;Description automatically generated">
                 <a:extLst>
                   <a:ext uri="{FF2B5EF4-FFF2-40B4-BE49-F238E27FC236}">
-                    <a16:creationId xmlns:a16="http://schemas.microsoft.com/office/drawing/2014/main" id="{4AC55DCA-6B09-410B-B771-532FE7006952}"/>
+                    <a16:creationId xmlns:a16="http://schemas.microsoft.com/office/drawing/2014/main" id="{5642CCD2-1399-4B15-9D50-7D381ED941EF}"/>
                   </a:ext>
                 </a:extLst>
               </p:cNvPr>
@@ -4659,55 +4766,20 @@
               <p:nvPr/>
             </p:nvPicPr>
             <p:blipFill rotWithShape="1">
-              <a:blip r:embed="rId2">
+              <a:blip r:embed="rId4">
                 <a:extLst>
                   <a:ext uri="{28A0092B-C50C-407E-A947-70E740481C1C}">
                     <a14:useLocalDpi xmlns:a14="http://schemas.microsoft.com/office/drawing/2010/main" val="0"/>
                   </a:ext>
                 </a:extLst>
               </a:blip>
-              <a:srcRect l="27580" t="37799" r="24943" b="32945"/>
+              <a:srcRect l="26940" t="38333" r="24186" b="33472"/>
               <a:stretch/>
             </p:blipFill>
             <p:spPr>
               <a:xfrm>
-                <a:off x="-2244261" y="-816266"/>
-                <a:ext cx="8340261" cy="4245266"/>
-              </a:xfrm>
-              <a:prstGeom prst="rect">
-                <a:avLst/>
-              </a:prstGeom>
-            </p:spPr>
-          </p:pic>
-          <p:pic>
-            <p:nvPicPr>
-              <p:cNvPr id="6" name="Picture 5" descr="Chart, schematic&#10;&#10;Description automatically generated">
-                <a:extLst>
-                  <a:ext uri="{FF2B5EF4-FFF2-40B4-BE49-F238E27FC236}">
-                    <a16:creationId xmlns:a16="http://schemas.microsoft.com/office/drawing/2014/main" id="{F1F664B2-ACB2-42D0-8EC2-496D964288A7}"/>
-                  </a:ext>
-                </a:extLst>
-              </p:cNvPr>
-              <p:cNvPicPr>
-                <a:picLocks noChangeAspect="1"/>
-              </p:cNvPicPr>
-              <p:nvPr/>
-            </p:nvPicPr>
-            <p:blipFill rotWithShape="1">
-              <a:blip r:embed="rId3">
-                <a:extLst>
-                  <a:ext uri="{28A0092B-C50C-407E-A947-70E740481C1C}">
-                    <a14:useLocalDpi xmlns:a14="http://schemas.microsoft.com/office/drawing/2010/main" val="0"/>
-                  </a:ext>
-                </a:extLst>
-              </a:blip>
-              <a:srcRect l="19040" t="35601" r="25664" b="33746"/>
-              <a:stretch/>
-            </p:blipFill>
-            <p:spPr>
-              <a:xfrm>
-                <a:off x="6095999" y="-821449"/>
-                <a:ext cx="9967537" cy="4564193"/>
+                <a:off x="-3006261" y="3397348"/>
+                <a:ext cx="9102261" cy="4337463"/>
               </a:xfrm>
               <a:prstGeom prst="rect">
                 <a:avLst/>
@@ -4717,10 +4789,10 @@
         </p:grpSp>
         <p:pic>
           <p:nvPicPr>
-            <p:cNvPr id="12" name="Picture 11" descr="Chart&#10;&#10;Description automatically generated">
+            <p:cNvPr id="10" name="Picture 9" descr="Diagram, schematic&#10;&#10;Description automatically generated">
               <a:extLst>
                 <a:ext uri="{FF2B5EF4-FFF2-40B4-BE49-F238E27FC236}">
-                  <a16:creationId xmlns:a16="http://schemas.microsoft.com/office/drawing/2014/main" id="{5642CCD2-1399-4B15-9D50-7D381ED941EF}"/>
+                  <a16:creationId xmlns:a16="http://schemas.microsoft.com/office/drawing/2014/main" id="{13173B06-249E-4C05-BA7B-47ED23B302AC}"/>
                 </a:ext>
               </a:extLst>
             </p:cNvPr>
@@ -4730,20 +4802,20 @@
             <p:nvPr/>
           </p:nvPicPr>
           <p:blipFill rotWithShape="1">
-            <a:blip r:embed="rId4">
+            <a:blip r:embed="rId5">
               <a:extLst>
                 <a:ext uri="{28A0092B-C50C-407E-A947-70E740481C1C}">
                   <a14:useLocalDpi xmlns:a14="http://schemas.microsoft.com/office/drawing/2010/main" val="0"/>
                 </a:ext>
               </a:extLst>
             </a:blip>
-            <a:srcRect l="26940" t="38333" r="24186" b="33472"/>
+            <a:srcRect l="13655" t="35111" r="25622" b="34133"/>
             <a:stretch/>
           </p:blipFill>
           <p:spPr>
             <a:xfrm>
-              <a:off x="-3006261" y="3397348"/>
-              <a:ext cx="9102261" cy="4337463"/>
+              <a:off x="6386949" y="3962399"/>
+              <a:ext cx="9205536" cy="3851409"/>
             </a:xfrm>
             <a:prstGeom prst="rect">
               <a:avLst/>
@@ -4751,41 +4823,6 @@
           </p:spPr>
         </p:pic>
       </p:grpSp>
-      <p:pic>
-        <p:nvPicPr>
-          <p:cNvPr id="10" name="Picture 9" descr="Diagram, schematic&#10;&#10;Description automatically generated">
-            <a:extLst>
-              <a:ext uri="{FF2B5EF4-FFF2-40B4-BE49-F238E27FC236}">
-                <a16:creationId xmlns:a16="http://schemas.microsoft.com/office/drawing/2014/main" id="{13173B06-249E-4C05-BA7B-47ED23B302AC}"/>
-              </a:ext>
-            </a:extLst>
-          </p:cNvPr>
-          <p:cNvPicPr>
-            <a:picLocks noChangeAspect="1"/>
-          </p:cNvPicPr>
-          <p:nvPr/>
-        </p:nvPicPr>
-        <p:blipFill rotWithShape="1">
-          <a:blip r:embed="rId5">
-            <a:extLst>
-              <a:ext uri="{28A0092B-C50C-407E-A947-70E740481C1C}">
-                <a14:useLocalDpi xmlns:a14="http://schemas.microsoft.com/office/drawing/2010/main" val="0"/>
-              </a:ext>
-            </a:extLst>
-          </a:blip>
-          <a:srcRect l="13655" t="35111" r="25622" b="34133"/>
-          <a:stretch/>
-        </p:blipFill>
-        <p:spPr>
-          <a:xfrm>
-            <a:off x="6386949" y="3962399"/>
-            <a:ext cx="9205536" cy="3851409"/>
-          </a:xfrm>
-          <a:prstGeom prst="rect">
-            <a:avLst/>
-          </a:prstGeom>
-        </p:spPr>
-      </p:pic>
     </p:spTree>
     <p:extLst>
       <p:ext uri="{BB962C8B-B14F-4D97-AF65-F5344CB8AC3E}">

</xml_diff>